<commit_message>
Using a new lovely Jorge Barroso picture
</commit_message>
<xml_diff>
--- a/Introducing Clean Architecture.pptx
+++ b/Introducing Clean Architecture.pptx
@@ -11321,9 +11321,180 @@
           <a:chExt cx="0" cy="0"/>
         </a:xfrm>
       </p:grpSpPr>
+      <p:sp>
+        <p:nvSpPr>
+          <p:cNvPr id="6" name="1 Título"/>
+          <p:cNvSpPr txBox="1">
+            <a:spLocks/>
+          </p:cNvSpPr>
+          <p:nvPr/>
+        </p:nvSpPr>
+        <p:spPr>
+          <a:xfrm>
+            <a:off x="0" y="2571750"/>
+            <a:ext cx="9144000" cy="1368152"/>
+          </a:xfrm>
+          <a:prstGeom prst="rect">
+            <a:avLst/>
+          </a:prstGeom>
+        </p:spPr>
+        <p:txBody>
+          <a:bodyPr vert="horz" lIns="91440" tIns="45720" rIns="91440" bIns="45720" rtlCol="0" anchor="ctr">
+            <a:normAutofit/>
+          </a:bodyPr>
+          <a:lstStyle>
+            <a:lvl1pPr algn="ctr" defTabSz="914400" rtl="0" eaLnBrk="1" latinLnBrk="0" hangingPunct="1">
+              <a:spcBef>
+                <a:spcPct val="0"/>
+              </a:spcBef>
+              <a:buNone/>
+              <a:defRPr sz="4400" kern="1200">
+                <a:solidFill>
+                  <a:schemeClr val="tx1"/>
+                </a:solidFill>
+                <a:latin typeface="+mj-lt"/>
+                <a:ea typeface="+mj-ea"/>
+                <a:cs typeface="+mj-cs"/>
+              </a:defRPr>
+            </a:lvl1pPr>
+          </a:lstStyle>
+          <a:p>
+            <a:r>
+              <a:rPr lang="es-ES" sz="3200" dirty="0" smtClean="0">
+                <a:solidFill>
+                  <a:schemeClr val="bg1"/>
+                </a:solidFill>
+              </a:rPr>
+              <a:t>Jorge Barroso</a:t>
+            </a:r>
+            <a:r>
+              <a:rPr lang="es-ES" sz="800" dirty="0" smtClean="0">
+                <a:solidFill>
+                  <a:schemeClr val="bg1"/>
+                </a:solidFill>
+              </a:rPr>
+              <a:t/>
+            </a:r>
+            <a:br>
+              <a:rPr lang="es-ES" sz="800" dirty="0" smtClean="0">
+                <a:solidFill>
+                  <a:schemeClr val="bg1"/>
+                </a:solidFill>
+              </a:rPr>
+            </a:br>
+            <a:r>
+              <a:rPr lang="es-ES" sz="800" dirty="0" smtClean="0">
+                <a:solidFill>
+                  <a:schemeClr val="bg1"/>
+                </a:solidFill>
+              </a:rPr>
+              <a:t/>
+            </a:r>
+            <a:br>
+              <a:rPr lang="es-ES" sz="800" dirty="0" smtClean="0">
+                <a:solidFill>
+                  <a:schemeClr val="bg1"/>
+                </a:solidFill>
+              </a:rPr>
+            </a:br>
+            <a:r>
+              <a:rPr lang="es-ES" sz="2000" dirty="0" err="1" smtClean="0">
+                <a:solidFill>
+                  <a:schemeClr val="bg1"/>
+                </a:solidFill>
+              </a:rPr>
+              <a:t>InfoJobs</a:t>
+            </a:r>
+            <a:r>
+              <a:rPr lang="es-ES" sz="2000" dirty="0" smtClean="0">
+                <a:solidFill>
+                  <a:schemeClr val="bg1"/>
+                </a:solidFill>
+              </a:rPr>
+              <a:t>’ </a:t>
+            </a:r>
+            <a:r>
+              <a:rPr lang="es-ES" sz="2000" dirty="0" err="1" smtClean="0">
+                <a:solidFill>
+                  <a:schemeClr val="bg1"/>
+                </a:solidFill>
+              </a:rPr>
+              <a:t>architecture</a:t>
+            </a:r>
+            <a:r>
+              <a:rPr lang="es-ES" sz="2000" dirty="0" smtClean="0">
+                <a:solidFill>
+                  <a:schemeClr val="bg1"/>
+                </a:solidFill>
+              </a:rPr>
+              <a:t> </a:t>
+            </a:r>
+            <a:r>
+              <a:rPr lang="es-ES" sz="2000" b="1" dirty="0" err="1" smtClean="0">
+                <a:solidFill>
+                  <a:schemeClr val="bg1"/>
+                </a:solidFill>
+              </a:rPr>
+              <a:t>father</a:t>
+            </a:r>
+            <a:r>
+              <a:rPr lang="es-ES" sz="2000" b="1" dirty="0" smtClean="0">
+                <a:solidFill>
+                  <a:schemeClr val="bg1"/>
+                </a:solidFill>
+              </a:rPr>
+              <a:t/>
+            </a:r>
+            <a:br>
+              <a:rPr lang="es-ES" sz="2000" b="1" dirty="0" smtClean="0">
+                <a:solidFill>
+                  <a:schemeClr val="bg1"/>
+                </a:solidFill>
+              </a:rPr>
+            </a:br>
+            <a:r>
+              <a:rPr lang="es-ES" sz="2000" b="1" dirty="0" err="1" smtClean="0">
+                <a:solidFill>
+                  <a:schemeClr val="bg1"/>
+                </a:solidFill>
+              </a:rPr>
+              <a:t>Karumi</a:t>
+            </a:r>
+            <a:r>
+              <a:rPr lang="es-ES" sz="2000" b="1" dirty="0" smtClean="0">
+                <a:solidFill>
+                  <a:schemeClr val="bg1"/>
+                </a:solidFill>
+              </a:rPr>
+              <a:t> </a:t>
+            </a:r>
+            <a:r>
+              <a:rPr lang="es-ES" sz="2000" dirty="0" smtClean="0">
+                <a:solidFill>
+                  <a:schemeClr val="bg1"/>
+                </a:solidFill>
+              </a:rPr>
+              <a:t>Android </a:t>
+            </a:r>
+            <a:r>
+              <a:rPr lang="es-ES" sz="2000" dirty="0" err="1" smtClean="0">
+                <a:solidFill>
+                  <a:schemeClr val="bg1"/>
+                </a:solidFill>
+              </a:rPr>
+              <a:t>Expert</a:t>
+            </a:r>
+            <a:endParaRPr lang="ca-ES" sz="3200" dirty="0">
+              <a:solidFill>
+                <a:schemeClr val="bg1"/>
+              </a:solidFill>
+            </a:endParaRPr>
+          </a:p>
+        </p:txBody>
+      </p:sp>
       <p:pic>
         <p:nvPicPr>
-          <p:cNvPr id="1026" name="Picture 2" descr="C:\Users\Roc Boronat\Desktop\jorhell.png"/>
+          <p:cNvPr id="2" name="Picture 2" descr="C:\Users\Roc\Desktop\Jorge-Barroso.png"/>
           <p:cNvPicPr>
             <a:picLocks noChangeAspect="1" noChangeArrowheads="1"/>
           </p:cNvPicPr>
@@ -11344,8 +11515,8 @@
         </p:blipFill>
         <p:spPr bwMode="auto">
           <a:xfrm>
-            <a:off x="3779912" y="771550"/>
-            <a:ext cx="1569878" cy="1569877"/>
+            <a:off x="3779912" y="771549"/>
+            <a:ext cx="1569877" cy="1569877"/>
           </a:xfrm>
           <a:prstGeom prst="rect">
             <a:avLst/>
@@ -11362,177 +11533,6 @@
           </a:extLst>
         </p:spPr>
       </p:pic>
-      <p:sp>
-        <p:nvSpPr>
-          <p:cNvPr id="6" name="1 Título"/>
-          <p:cNvSpPr txBox="1">
-            <a:spLocks/>
-          </p:cNvSpPr>
-          <p:nvPr/>
-        </p:nvSpPr>
-        <p:spPr>
-          <a:xfrm>
-            <a:off x="0" y="2571750"/>
-            <a:ext cx="9144000" cy="1368152"/>
-          </a:xfrm>
-          <a:prstGeom prst="rect">
-            <a:avLst/>
-          </a:prstGeom>
-        </p:spPr>
-        <p:txBody>
-          <a:bodyPr vert="horz" lIns="91440" tIns="45720" rIns="91440" bIns="45720" rtlCol="0" anchor="ctr">
-            <a:normAutofit/>
-          </a:bodyPr>
-          <a:lstStyle>
-            <a:lvl1pPr algn="ctr" defTabSz="914400" rtl="0" eaLnBrk="1" latinLnBrk="0" hangingPunct="1">
-              <a:spcBef>
-                <a:spcPct val="0"/>
-              </a:spcBef>
-              <a:buNone/>
-              <a:defRPr sz="4400" kern="1200">
-                <a:solidFill>
-                  <a:schemeClr val="tx1"/>
-                </a:solidFill>
-                <a:latin typeface="+mj-lt"/>
-                <a:ea typeface="+mj-ea"/>
-                <a:cs typeface="+mj-cs"/>
-              </a:defRPr>
-            </a:lvl1pPr>
-          </a:lstStyle>
-          <a:p>
-            <a:r>
-              <a:rPr lang="es-ES" sz="3200" dirty="0" smtClean="0">
-                <a:solidFill>
-                  <a:schemeClr val="bg1"/>
-                </a:solidFill>
-              </a:rPr>
-              <a:t>Jorge Barroso</a:t>
-            </a:r>
-            <a:r>
-              <a:rPr lang="es-ES" sz="800" dirty="0" smtClean="0">
-                <a:solidFill>
-                  <a:schemeClr val="bg1"/>
-                </a:solidFill>
-              </a:rPr>
-              <a:t/>
-            </a:r>
-            <a:br>
-              <a:rPr lang="es-ES" sz="800" dirty="0" smtClean="0">
-                <a:solidFill>
-                  <a:schemeClr val="bg1"/>
-                </a:solidFill>
-              </a:rPr>
-            </a:br>
-            <a:r>
-              <a:rPr lang="es-ES" sz="800" dirty="0" smtClean="0">
-                <a:solidFill>
-                  <a:schemeClr val="bg1"/>
-                </a:solidFill>
-              </a:rPr>
-              <a:t/>
-            </a:r>
-            <a:br>
-              <a:rPr lang="es-ES" sz="800" dirty="0" smtClean="0">
-                <a:solidFill>
-                  <a:schemeClr val="bg1"/>
-                </a:solidFill>
-              </a:rPr>
-            </a:br>
-            <a:r>
-              <a:rPr lang="es-ES" sz="2000" dirty="0" err="1" smtClean="0">
-                <a:solidFill>
-                  <a:schemeClr val="bg1"/>
-                </a:solidFill>
-              </a:rPr>
-              <a:t>InfoJobs</a:t>
-            </a:r>
-            <a:r>
-              <a:rPr lang="es-ES" sz="2000" dirty="0" smtClean="0">
-                <a:solidFill>
-                  <a:schemeClr val="bg1"/>
-                </a:solidFill>
-              </a:rPr>
-              <a:t>’ </a:t>
-            </a:r>
-            <a:r>
-              <a:rPr lang="es-ES" sz="2000" dirty="0" err="1" smtClean="0">
-                <a:solidFill>
-                  <a:schemeClr val="bg1"/>
-                </a:solidFill>
-              </a:rPr>
-              <a:t>architecture</a:t>
-            </a:r>
-            <a:r>
-              <a:rPr lang="es-ES" sz="2000" dirty="0" smtClean="0">
-                <a:solidFill>
-                  <a:schemeClr val="bg1"/>
-                </a:solidFill>
-              </a:rPr>
-              <a:t> </a:t>
-            </a:r>
-            <a:r>
-              <a:rPr lang="es-ES" sz="2000" b="1" dirty="0" err="1" smtClean="0">
-                <a:solidFill>
-                  <a:schemeClr val="bg1"/>
-                </a:solidFill>
-              </a:rPr>
-              <a:t>father</a:t>
-            </a:r>
-            <a:r>
-              <a:rPr lang="es-ES" sz="2000" b="1" dirty="0" smtClean="0">
-                <a:solidFill>
-                  <a:schemeClr val="bg1"/>
-                </a:solidFill>
-              </a:rPr>
-              <a:t/>
-            </a:r>
-            <a:br>
-              <a:rPr lang="es-ES" sz="2000" b="1" dirty="0" smtClean="0">
-                <a:solidFill>
-                  <a:schemeClr val="bg1"/>
-                </a:solidFill>
-              </a:rPr>
-            </a:br>
-            <a:r>
-              <a:rPr lang="es-ES" sz="2000" b="1" dirty="0" err="1" smtClean="0">
-                <a:solidFill>
-                  <a:schemeClr val="bg1"/>
-                </a:solidFill>
-              </a:rPr>
-              <a:t>Karumi</a:t>
-            </a:r>
-            <a:r>
-              <a:rPr lang="es-ES" sz="2000" b="1" dirty="0" smtClean="0">
-                <a:solidFill>
-                  <a:schemeClr val="bg1"/>
-                </a:solidFill>
-              </a:rPr>
-              <a:t> </a:t>
-            </a:r>
-            <a:r>
-              <a:rPr lang="es-ES" sz="2000" dirty="0" smtClean="0">
-                <a:solidFill>
-                  <a:schemeClr val="bg1"/>
-                </a:solidFill>
-              </a:rPr>
-              <a:t>Android </a:t>
-            </a:r>
-            <a:r>
-              <a:rPr lang="es-ES" sz="2000" dirty="0" err="1" smtClean="0">
-                <a:solidFill>
-                  <a:schemeClr val="bg1"/>
-                </a:solidFill>
-              </a:rPr>
-              <a:t>Expert</a:t>
-            </a:r>
-            <a:endParaRPr lang="ca-ES" sz="3200" dirty="0">
-              <a:solidFill>
-                <a:schemeClr val="bg1"/>
-              </a:solidFill>
-            </a:endParaRPr>
-          </a:p>
-        </p:txBody>
-      </p:sp>
     </p:spTree>
     <p:extLst>
       <p:ext uri="{BB962C8B-B14F-4D97-AF65-F5344CB8AC3E}">

</xml_diff>